<commit_message>
Add final touches to presentation and describe of all patrons to notebook.
</commit_message>
<xml_diff>
--- a/The Metropolitan Museum of Art.pptx
+++ b/The Metropolitan Museum of Art.pptx
@@ -9,14 +9,14 @@
     <p:sldId id="257" r:id="rId3"/>
     <p:sldId id="258" r:id="rId4"/>
     <p:sldId id="259" r:id="rId5"/>
-    <p:sldId id="262" r:id="rId6"/>
-    <p:sldId id="263" r:id="rId7"/>
-    <p:sldId id="261" r:id="rId8"/>
-    <p:sldId id="267" r:id="rId9"/>
-    <p:sldId id="264" r:id="rId10"/>
-    <p:sldId id="266" r:id="rId11"/>
-    <p:sldId id="265" r:id="rId12"/>
-    <p:sldId id="260" r:id="rId13"/>
+    <p:sldId id="263" r:id="rId6"/>
+    <p:sldId id="260" r:id="rId7"/>
+    <p:sldId id="262" r:id="rId8"/>
+    <p:sldId id="261" r:id="rId9"/>
+    <p:sldId id="267" r:id="rId10"/>
+    <p:sldId id="264" r:id="rId11"/>
+    <p:sldId id="266" r:id="rId12"/>
+    <p:sldId id="265" r:id="rId13"/>
     <p:sldId id="268" r:id="rId14"/>
     <p:sldId id="269" r:id="rId15"/>
   </p:sldIdLst>
@@ -3514,8 +3514,8 @@
           <a:lstStyle/>
           <a:p>
             <a:r>
-              <a:rPr lang="en-US" sz="3600" dirty="0"/>
-              <a:t>Select Countries: Nigeria Breakdown by Object Type</a:t>
+              <a:rPr lang="en-US" sz="4000" dirty="0"/>
+              <a:t>Select Countries: Japan Breakdown by Object Type</a:t>
             </a:r>
           </a:p>
         </p:txBody>
@@ -3544,20 +3544,21 @@
               </a:ext>
             </a:extLst>
           </a:blip>
-          <a:srcRect/>
-          <a:stretch/>
+          <a:stretch>
+            <a:fillRect/>
+          </a:stretch>
         </p:blipFill>
         <p:spPr>
           <a:xfrm>
-            <a:off x="2941924" y="1687455"/>
-            <a:ext cx="5269059" cy="5173778"/>
+            <a:off x="2358736" y="1684222"/>
+            <a:ext cx="6435436" cy="5173778"/>
           </a:xfrm>
         </p:spPr>
       </p:pic>
     </p:spTree>
     <p:extLst>
       <p:ext uri="{BB962C8B-B14F-4D97-AF65-F5344CB8AC3E}">
-        <p14:creationId xmlns:p14="http://schemas.microsoft.com/office/powerpoint/2010/main" val="1207957710"/>
+        <p14:creationId xmlns:p14="http://schemas.microsoft.com/office/powerpoint/2010/main" val="3165494617"/>
       </p:ext>
     </p:extLst>
   </p:cSld>
@@ -3617,7 +3618,7 @@
           <a:p>
             <a:r>
               <a:rPr lang="en-US" sz="3600" dirty="0"/>
-              <a:t>Select Countries: Germany Breakdown by Object Type</a:t>
+              <a:t>Select Countries: Nigeria Breakdown by Object Type</a:t>
             </a:r>
           </a:p>
         </p:txBody>
@@ -3651,15 +3652,15 @@
         </p:blipFill>
         <p:spPr>
           <a:xfrm>
-            <a:off x="2607031" y="1684222"/>
-            <a:ext cx="5938846" cy="5173778"/>
+            <a:off x="2941924" y="1687455"/>
+            <a:ext cx="5269059" cy="5173778"/>
           </a:xfrm>
         </p:spPr>
       </p:pic>
     </p:spTree>
     <p:extLst>
       <p:ext uri="{BB962C8B-B14F-4D97-AF65-F5344CB8AC3E}">
-        <p14:creationId xmlns:p14="http://schemas.microsoft.com/office/powerpoint/2010/main" val="1719819917"/>
+        <p14:creationId xmlns:p14="http://schemas.microsoft.com/office/powerpoint/2010/main" val="1207957710"/>
       </p:ext>
     </p:extLst>
   </p:cSld>
@@ -3712,22 +3713,24 @@
         </p:nvSpPr>
         <p:spPr/>
         <p:txBody>
-          <a:bodyPr/>
-          <a:lstStyle/>
-          <a:p>
-            <a:r>
-              <a:rPr lang="en-US" dirty="0"/>
-              <a:t>Top Ten Object Types</a:t>
+          <a:bodyPr>
+            <a:normAutofit/>
+          </a:bodyPr>
+          <a:lstStyle/>
+          <a:p>
+            <a:r>
+              <a:rPr lang="en-US" sz="3600" dirty="0"/>
+              <a:t>Select Countries: Germany Breakdown by Object Type</a:t>
             </a:r>
           </a:p>
         </p:txBody>
       </p:sp>
       <p:pic>
         <p:nvPicPr>
-          <p:cNvPr id="5" name="Content Placeholder 4">
-            <a:extLst>
-              <a:ext uri="{FF2B5EF4-FFF2-40B4-BE49-F238E27FC236}">
-                <a16:creationId xmlns:a16="http://schemas.microsoft.com/office/drawing/2014/main" id="{6EAECADF-1719-4B6A-B2A1-29105BD40D07}"/>
+          <p:cNvPr id="7" name="Content Placeholder 6">
+            <a:extLst>
+              <a:ext uri="{FF2B5EF4-FFF2-40B4-BE49-F238E27FC236}">
+                <a16:creationId xmlns:a16="http://schemas.microsoft.com/office/drawing/2014/main" id="{404C958D-46E2-4E55-95BD-3554D96E5E9B}"/>
               </a:ext>
             </a:extLst>
           </p:cNvPr>
@@ -3746,21 +3749,20 @@
               </a:ext>
             </a:extLst>
           </a:blip>
-          <a:stretch>
-            <a:fillRect/>
-          </a:stretch>
+          <a:srcRect/>
+          <a:stretch/>
         </p:blipFill>
         <p:spPr>
           <a:xfrm>
-            <a:off x="2421082" y="1551350"/>
-            <a:ext cx="7349836" cy="4899888"/>
+            <a:off x="2607031" y="1684222"/>
+            <a:ext cx="5938846" cy="5173778"/>
           </a:xfrm>
         </p:spPr>
       </p:pic>
     </p:spTree>
     <p:extLst>
       <p:ext uri="{BB962C8B-B14F-4D97-AF65-F5344CB8AC3E}">
-        <p14:creationId xmlns:p14="http://schemas.microsoft.com/office/powerpoint/2010/main" val="2657261464"/>
+        <p14:creationId xmlns:p14="http://schemas.microsoft.com/office/powerpoint/2010/main" val="1719819917"/>
       </p:ext>
     </p:extLst>
   </p:cSld>
@@ -3919,328 +3921,64 @@
           <a:p>
             <a:r>
               <a:rPr lang="en-US" dirty="0"/>
-              <a:t>Top Ten Patrons</a:t>
-            </a:r>
-          </a:p>
-        </p:txBody>
-      </p:sp>
-      <p:graphicFrame>
-        <p:nvGraphicFramePr>
-          <p:cNvPr id="3" name="Table 4">
-            <a:extLst>
-              <a:ext uri="{FF2B5EF4-FFF2-40B4-BE49-F238E27FC236}">
-                <a16:creationId xmlns:a16="http://schemas.microsoft.com/office/drawing/2014/main" id="{F4E15C8A-6511-44E7-83D6-0BA4B88AD3AB}"/>
-              </a:ext>
-            </a:extLst>
-          </p:cNvPr>
-          <p:cNvGraphicFramePr>
-            <a:graphicFrameLocks noGrp="1"/>
-          </p:cNvGraphicFramePr>
+              <a:t>Conclusions</a:t>
+            </a:r>
+          </a:p>
+        </p:txBody>
+      </p:sp>
+      <p:sp>
+        <p:nvSpPr>
+          <p:cNvPr id="5" name="Content Placeholder 4">
+            <a:extLst>
+              <a:ext uri="{FF2B5EF4-FFF2-40B4-BE49-F238E27FC236}">
+                <a16:creationId xmlns:a16="http://schemas.microsoft.com/office/drawing/2014/main" id="{17F7C038-F037-4634-8E30-710CB8EAB38C}"/>
+              </a:ext>
+            </a:extLst>
+          </p:cNvPr>
+          <p:cNvSpPr>
+            <a:spLocks noGrp="1"/>
+          </p:cNvSpPr>
           <p:nvPr>
             <p:ph idx="1"/>
-            <p:extLst>
-              <p:ext uri="{D42A27DB-BD31-4B8C-83A1-F6EECF244321}">
-                <p14:modId xmlns:p14="http://schemas.microsoft.com/office/powerpoint/2010/main" val="1468973411"/>
-              </p:ext>
-            </p:extLst>
-          </p:nvPr>
-        </p:nvGraphicFramePr>
-        <p:xfrm>
-          <a:off x="838200" y="1825625"/>
-          <a:ext cx="10515597" cy="2595880"/>
-        </p:xfrm>
-        <a:graphic>
-          <a:graphicData uri="http://schemas.openxmlformats.org/drawingml/2006/table">
-            <a:tbl>
-              <a:tblPr firstRow="1" bandRow="1">
-                <a:tableStyleId>{5C22544A-7EE6-4342-B048-85BDC9FD1C3A}</a:tableStyleId>
-              </a:tblPr>
-              <a:tblGrid>
-                <a:gridCol w="3505199">
-                  <a:extLst>
-                    <a:ext uri="{9D8B030D-6E8A-4147-A177-3AD203B41FA5}">
-                      <a16:colId xmlns:a16="http://schemas.microsoft.com/office/drawing/2014/main" val="64326433"/>
-                    </a:ext>
-                  </a:extLst>
-                </a:gridCol>
-                <a:gridCol w="3505199">
-                  <a:extLst>
-                    <a:ext uri="{9D8B030D-6E8A-4147-A177-3AD203B41FA5}">
-                      <a16:colId xmlns:a16="http://schemas.microsoft.com/office/drawing/2014/main" val="3582847510"/>
-                    </a:ext>
-                  </a:extLst>
-                </a:gridCol>
-                <a:gridCol w="3505199">
-                  <a:extLst>
-                    <a:ext uri="{9D8B030D-6E8A-4147-A177-3AD203B41FA5}">
-                      <a16:colId xmlns:a16="http://schemas.microsoft.com/office/drawing/2014/main" val="2744218016"/>
-                    </a:ext>
-                  </a:extLst>
-                </a:gridCol>
-              </a:tblGrid>
-              <a:tr h="370840">
-                <a:tc>
-                  <a:txBody>
-                    <a:bodyPr/>
-                    <a:lstStyle/>
-                    <a:p>
-                      <a:endParaRPr lang="en-US"/>
-                    </a:p>
-                  </a:txBody>
-                  <a:tcPr/>
-                </a:tc>
-                <a:tc>
-                  <a:txBody>
-                    <a:bodyPr/>
-                    <a:lstStyle/>
-                    <a:p>
-                      <a:endParaRPr lang="en-US"/>
-                    </a:p>
-                  </a:txBody>
-                  <a:tcPr/>
-                </a:tc>
-                <a:tc>
-                  <a:txBody>
-                    <a:bodyPr/>
-                    <a:lstStyle/>
-                    <a:p>
-                      <a:endParaRPr lang="en-US" dirty="0"/>
-                    </a:p>
-                  </a:txBody>
-                  <a:tcPr/>
-                </a:tc>
-                <a:extLst>
-                  <a:ext uri="{0D108BD9-81ED-4DB2-BD59-A6C34878D82A}">
-                    <a16:rowId xmlns:a16="http://schemas.microsoft.com/office/drawing/2014/main" val="2284538051"/>
-                  </a:ext>
-                </a:extLst>
-              </a:tr>
-              <a:tr h="370840">
-                <a:tc>
-                  <a:txBody>
-                    <a:bodyPr/>
-                    <a:lstStyle/>
-                    <a:p>
-                      <a:endParaRPr lang="en-US" dirty="0"/>
-                    </a:p>
-                  </a:txBody>
-                  <a:tcPr/>
-                </a:tc>
-                <a:tc>
-                  <a:txBody>
-                    <a:bodyPr/>
-                    <a:lstStyle/>
-                    <a:p>
-                      <a:endParaRPr lang="en-US"/>
-                    </a:p>
-                  </a:txBody>
-                  <a:tcPr/>
-                </a:tc>
-                <a:tc>
-                  <a:txBody>
-                    <a:bodyPr/>
-                    <a:lstStyle/>
-                    <a:p>
-                      <a:endParaRPr lang="en-US"/>
-                    </a:p>
-                  </a:txBody>
-                  <a:tcPr/>
-                </a:tc>
-                <a:extLst>
-                  <a:ext uri="{0D108BD9-81ED-4DB2-BD59-A6C34878D82A}">
-                    <a16:rowId xmlns:a16="http://schemas.microsoft.com/office/drawing/2014/main" val="3596396558"/>
-                  </a:ext>
-                </a:extLst>
-              </a:tr>
-              <a:tr h="370840">
-                <a:tc>
-                  <a:txBody>
-                    <a:bodyPr/>
-                    <a:lstStyle/>
-                    <a:p>
-                      <a:endParaRPr lang="en-US" dirty="0"/>
-                    </a:p>
-                  </a:txBody>
-                  <a:tcPr/>
-                </a:tc>
-                <a:tc>
-                  <a:txBody>
-                    <a:bodyPr/>
-                    <a:lstStyle/>
-                    <a:p>
-                      <a:endParaRPr lang="en-US"/>
-                    </a:p>
-                  </a:txBody>
-                  <a:tcPr/>
-                </a:tc>
-                <a:tc>
-                  <a:txBody>
-                    <a:bodyPr/>
-                    <a:lstStyle/>
-                    <a:p>
-                      <a:endParaRPr lang="en-US"/>
-                    </a:p>
-                  </a:txBody>
-                  <a:tcPr/>
-                </a:tc>
-                <a:extLst>
-                  <a:ext uri="{0D108BD9-81ED-4DB2-BD59-A6C34878D82A}">
-                    <a16:rowId xmlns:a16="http://schemas.microsoft.com/office/drawing/2014/main" val="1144320155"/>
-                  </a:ext>
-                </a:extLst>
-              </a:tr>
-              <a:tr h="370840">
-                <a:tc>
-                  <a:txBody>
-                    <a:bodyPr/>
-                    <a:lstStyle/>
-                    <a:p>
-                      <a:endParaRPr lang="en-US"/>
-                    </a:p>
-                  </a:txBody>
-                  <a:tcPr/>
-                </a:tc>
-                <a:tc>
-                  <a:txBody>
-                    <a:bodyPr/>
-                    <a:lstStyle/>
-                    <a:p>
-                      <a:endParaRPr lang="en-US"/>
-                    </a:p>
-                  </a:txBody>
-                  <a:tcPr/>
-                </a:tc>
-                <a:tc>
-                  <a:txBody>
-                    <a:bodyPr/>
-                    <a:lstStyle/>
-                    <a:p>
-                      <a:endParaRPr lang="en-US"/>
-                    </a:p>
-                  </a:txBody>
-                  <a:tcPr/>
-                </a:tc>
-                <a:extLst>
-                  <a:ext uri="{0D108BD9-81ED-4DB2-BD59-A6C34878D82A}">
-                    <a16:rowId xmlns:a16="http://schemas.microsoft.com/office/drawing/2014/main" val="3611774774"/>
-                  </a:ext>
-                </a:extLst>
-              </a:tr>
-              <a:tr h="370840">
-                <a:tc>
-                  <a:txBody>
-                    <a:bodyPr/>
-                    <a:lstStyle/>
-                    <a:p>
-                      <a:endParaRPr lang="en-US"/>
-                    </a:p>
-                  </a:txBody>
-                  <a:tcPr/>
-                </a:tc>
-                <a:tc>
-                  <a:txBody>
-                    <a:bodyPr/>
-                    <a:lstStyle/>
-                    <a:p>
-                      <a:endParaRPr lang="en-US"/>
-                    </a:p>
-                  </a:txBody>
-                  <a:tcPr/>
-                </a:tc>
-                <a:tc>
-                  <a:txBody>
-                    <a:bodyPr/>
-                    <a:lstStyle/>
-                    <a:p>
-                      <a:endParaRPr lang="en-US"/>
-                    </a:p>
-                  </a:txBody>
-                  <a:tcPr/>
-                </a:tc>
-                <a:extLst>
-                  <a:ext uri="{0D108BD9-81ED-4DB2-BD59-A6C34878D82A}">
-                    <a16:rowId xmlns:a16="http://schemas.microsoft.com/office/drawing/2014/main" val="406875899"/>
-                  </a:ext>
-                </a:extLst>
-              </a:tr>
-              <a:tr h="370840">
-                <a:tc>
-                  <a:txBody>
-                    <a:bodyPr/>
-                    <a:lstStyle/>
-                    <a:p>
-                      <a:endParaRPr lang="en-US"/>
-                    </a:p>
-                  </a:txBody>
-                  <a:tcPr/>
-                </a:tc>
-                <a:tc>
-                  <a:txBody>
-                    <a:bodyPr/>
-                    <a:lstStyle/>
-                    <a:p>
-                      <a:endParaRPr lang="en-US"/>
-                    </a:p>
-                  </a:txBody>
-                  <a:tcPr/>
-                </a:tc>
-                <a:tc>
-                  <a:txBody>
-                    <a:bodyPr/>
-                    <a:lstStyle/>
-                    <a:p>
-                      <a:endParaRPr lang="en-US"/>
-                    </a:p>
-                  </a:txBody>
-                  <a:tcPr/>
-                </a:tc>
-                <a:extLst>
-                  <a:ext uri="{0D108BD9-81ED-4DB2-BD59-A6C34878D82A}">
-                    <a16:rowId xmlns:a16="http://schemas.microsoft.com/office/drawing/2014/main" val="437030295"/>
-                  </a:ext>
-                </a:extLst>
-              </a:tr>
-              <a:tr h="370840">
-                <a:tc>
-                  <a:txBody>
-                    <a:bodyPr/>
-                    <a:lstStyle/>
-                    <a:p>
-                      <a:endParaRPr lang="en-US"/>
-                    </a:p>
-                  </a:txBody>
-                  <a:tcPr/>
-                </a:tc>
-                <a:tc>
-                  <a:txBody>
-                    <a:bodyPr/>
-                    <a:lstStyle/>
-                    <a:p>
-                      <a:endParaRPr lang="en-US"/>
-                    </a:p>
-                  </a:txBody>
-                  <a:tcPr/>
-                </a:tc>
-                <a:tc>
-                  <a:txBody>
-                    <a:bodyPr/>
-                    <a:lstStyle/>
-                    <a:p>
-                      <a:endParaRPr lang="en-US" dirty="0"/>
-                    </a:p>
-                  </a:txBody>
-                  <a:tcPr/>
-                </a:tc>
-                <a:extLst>
-                  <a:ext uri="{0D108BD9-81ED-4DB2-BD59-A6C34878D82A}">
-                    <a16:rowId xmlns:a16="http://schemas.microsoft.com/office/drawing/2014/main" val="4276572726"/>
-                  </a:ext>
-                </a:extLst>
-              </a:tr>
-            </a:tbl>
-          </a:graphicData>
-        </a:graphic>
-      </p:graphicFrame>
+          </p:nvPr>
+        </p:nvSpPr>
+        <p:spPr/>
+        <p:txBody>
+          <a:bodyPr/>
+          <a:lstStyle/>
+          <a:p>
+            <a:r>
+              <a:rPr lang="en-US" dirty="0"/>
+              <a:t>A more multi-indexed analysis would be necessary to more accurately represent the collection.</a:t>
+            </a:r>
+          </a:p>
+          <a:p>
+            <a:pPr lvl="1"/>
+            <a:r>
+              <a:rPr lang="en-US" dirty="0"/>
+              <a:t>It was observed that many records in the dataset were inconsistent possibly due to the objects life span and provenance.</a:t>
+            </a:r>
+          </a:p>
+          <a:p>
+            <a:r>
+              <a:rPr lang="en-US" dirty="0"/>
+              <a:t>The collection relies heavily on benefactors over actively acquiring objects itself.</a:t>
+            </a:r>
+          </a:p>
+          <a:p>
+            <a:r>
+              <a:rPr lang="en-US" dirty="0"/>
+              <a:t> Balanced representation of historical civilizations from across the globe.</a:t>
+            </a:r>
+          </a:p>
+          <a:p>
+            <a:r>
+              <a:rPr lang="en-US" dirty="0"/>
+              <a:t>The average number of objects from each benefactor is 8; the median is 1 and the largest was 2,319.</a:t>
+            </a:r>
+          </a:p>
+        </p:txBody>
+      </p:sp>
     </p:spTree>
     <p:extLst>
       <p:ext uri="{BB962C8B-B14F-4D97-AF65-F5344CB8AC3E}">
@@ -5224,7 +4962,7 @@
           <p:cNvPr id="2" name="Title 1">
             <a:extLst>
               <a:ext uri="{FF2B5EF4-FFF2-40B4-BE49-F238E27FC236}">
-                <a16:creationId xmlns:a16="http://schemas.microsoft.com/office/drawing/2014/main" id="{9225AD55-3C25-41C9-B645-47C7016AAE09}"/>
+                <a16:creationId xmlns:a16="http://schemas.microsoft.com/office/drawing/2014/main" id="{DA12FCDB-5857-42AE-9A87-D9369BF4B355}"/>
               </a:ext>
             </a:extLst>
           </p:cNvPr>
@@ -5242,34 +4980,85 @@
           <a:p>
             <a:r>
               <a:rPr lang="en-US" dirty="0"/>
-              <a:t>Heat Map of Countries</a:t>
+              <a:t>Number of Objects per Country</a:t>
             </a:r>
             <a:br>
               <a:rPr lang="en-US" dirty="0"/>
             </a:br>
-            <a:r>
-              <a:rPr lang="en-US" sz="2000" dirty="0"/>
-              <a:t>(number of objects)</a:t>
-            </a:r>
+            <a:endParaRPr lang="en-US" sz="1000" dirty="0"/>
+          </a:p>
+        </p:txBody>
+      </p:sp>
+      <p:sp>
+        <p:nvSpPr>
+          <p:cNvPr id="7" name="Content Placeholder 6">
+            <a:extLst>
+              <a:ext uri="{FF2B5EF4-FFF2-40B4-BE49-F238E27FC236}">
+                <a16:creationId xmlns:a16="http://schemas.microsoft.com/office/drawing/2014/main" id="{2E6ADED7-7347-4C29-857E-6344392EDBDB}"/>
+              </a:ext>
+            </a:extLst>
+          </p:cNvPr>
+          <p:cNvSpPr>
+            <a:spLocks noGrp="1"/>
+          </p:cNvSpPr>
+          <p:nvPr>
+            <p:ph idx="1"/>
+          </p:nvPr>
+        </p:nvSpPr>
+        <p:spPr/>
+        <p:txBody>
+          <a:bodyPr>
+            <a:normAutofit/>
+          </a:bodyPr>
+          <a:lstStyle/>
+          <a:p>
             <a:endParaRPr lang="en-US" dirty="0"/>
+          </a:p>
+          <a:p>
+            <a:endParaRPr lang="en-US" dirty="0"/>
+          </a:p>
+          <a:p>
+            <a:endParaRPr lang="en-US" dirty="0"/>
+          </a:p>
+          <a:p>
+            <a:endParaRPr lang="en-US" dirty="0"/>
+          </a:p>
+          <a:p>
+            <a:endParaRPr lang="en-US" dirty="0"/>
+          </a:p>
+          <a:p>
+            <a:endParaRPr lang="en-US" dirty="0"/>
+          </a:p>
+          <a:p>
+            <a:endParaRPr lang="en-US" dirty="0"/>
+          </a:p>
+          <a:p>
+            <a:endParaRPr lang="en-US" dirty="0"/>
+          </a:p>
+          <a:p>
+            <a:pPr marL="0" indent="0">
+              <a:buNone/>
+            </a:pPr>
+            <a:r>
+              <a:rPr lang="en-US" sz="1000" dirty="0"/>
+              <a:t>(United States removed for scaling)</a:t>
+            </a:r>
           </a:p>
         </p:txBody>
       </p:sp>
       <p:pic>
         <p:nvPicPr>
-          <p:cNvPr id="5" name="Content Placeholder 4">
-            <a:extLst>
-              <a:ext uri="{FF2B5EF4-FFF2-40B4-BE49-F238E27FC236}">
-                <a16:creationId xmlns:a16="http://schemas.microsoft.com/office/drawing/2014/main" id="{7ED40A56-187F-4F99-B572-53D08DE35B57}"/>
+          <p:cNvPr id="4" name="Picture 3">
+            <a:extLst>
+              <a:ext uri="{FF2B5EF4-FFF2-40B4-BE49-F238E27FC236}">
+                <a16:creationId xmlns:a16="http://schemas.microsoft.com/office/drawing/2014/main" id="{D294529F-A5EE-4FB0-BD9C-5A66E0F2BCCB}"/>
               </a:ext>
             </a:extLst>
           </p:cNvPr>
           <p:cNvPicPr>
-            <a:picLocks noGrp="1" noChangeAspect="1"/>
+            <a:picLocks noChangeAspect="1"/>
           </p:cNvPicPr>
-          <p:nvPr>
-            <p:ph idx="1"/>
-          </p:nvPr>
+          <p:nvPr/>
         </p:nvPicPr>
         <p:blipFill>
           <a:blip r:embed="rId2">
@@ -5285,15 +5074,18 @@
         </p:blipFill>
         <p:spPr>
           <a:xfrm>
-            <a:off x="80089" y="1647507"/>
-            <a:ext cx="12031822" cy="4707574"/>
+            <a:off x="608350" y="1599783"/>
+            <a:ext cx="10975300" cy="3658433"/>
           </a:xfrm>
+          <a:prstGeom prst="rect">
+            <a:avLst/>
+          </a:prstGeom>
         </p:spPr>
       </p:pic>
     </p:spTree>
     <p:extLst>
       <p:ext uri="{BB962C8B-B14F-4D97-AF65-F5344CB8AC3E}">
-        <p14:creationId xmlns:p14="http://schemas.microsoft.com/office/powerpoint/2010/main" val="1303035349"/>
+        <p14:creationId xmlns:p14="http://schemas.microsoft.com/office/powerpoint/2010/main" val="204801304"/>
       </p:ext>
     </p:extLst>
   </p:cSld>
@@ -5333,7 +5125,7 @@
           <p:cNvPr id="2" name="Title 1">
             <a:extLst>
               <a:ext uri="{FF2B5EF4-FFF2-40B4-BE49-F238E27FC236}">
-                <a16:creationId xmlns:a16="http://schemas.microsoft.com/office/drawing/2014/main" id="{DA12FCDB-5857-42AE-9A87-D9369BF4B355}"/>
+                <a16:creationId xmlns:a16="http://schemas.microsoft.com/office/drawing/2014/main" id="{555D1F26-F171-4F89-9348-D8380221C40B}"/>
               </a:ext>
             </a:extLst>
           </p:cNvPr>
@@ -5351,40 +5143,50 @@
           <a:p>
             <a:r>
               <a:rPr lang="en-US" dirty="0"/>
-              <a:t>Number of Objects per Country</a:t>
-            </a:r>
-          </a:p>
-        </p:txBody>
-      </p:sp>
-      <p:sp>
-        <p:nvSpPr>
-          <p:cNvPr id="7" name="Content Placeholder 6">
-            <a:extLst>
-              <a:ext uri="{FF2B5EF4-FFF2-40B4-BE49-F238E27FC236}">
-                <a16:creationId xmlns:a16="http://schemas.microsoft.com/office/drawing/2014/main" id="{2E6ADED7-7347-4C29-857E-6344392EDBDB}"/>
-              </a:ext>
-            </a:extLst>
-          </p:cNvPr>
-          <p:cNvSpPr>
-            <a:spLocks noGrp="1"/>
-          </p:cNvSpPr>
+              <a:t>Top Ten Object Types</a:t>
+            </a:r>
+          </a:p>
+        </p:txBody>
+      </p:sp>
+      <p:pic>
+        <p:nvPicPr>
+          <p:cNvPr id="5" name="Content Placeholder 4">
+            <a:extLst>
+              <a:ext uri="{FF2B5EF4-FFF2-40B4-BE49-F238E27FC236}">
+                <a16:creationId xmlns:a16="http://schemas.microsoft.com/office/drawing/2014/main" id="{6EAECADF-1719-4B6A-B2A1-29105BD40D07}"/>
+              </a:ext>
+            </a:extLst>
+          </p:cNvPr>
+          <p:cNvPicPr>
+            <a:picLocks noGrp="1" noChangeAspect="1"/>
+          </p:cNvPicPr>
           <p:nvPr>
             <p:ph idx="1"/>
           </p:nvPr>
-        </p:nvSpPr>
-        <p:spPr/>
-        <p:txBody>
-          <a:bodyPr/>
-          <a:lstStyle/>
-          <a:p>
-            <a:endParaRPr lang="en-US"/>
-          </a:p>
-        </p:txBody>
-      </p:sp>
+        </p:nvPicPr>
+        <p:blipFill>
+          <a:blip r:embed="rId2">
+            <a:extLst>
+              <a:ext uri="{28A0092B-C50C-407E-A947-70E740481C1C}">
+                <a14:useLocalDpi xmlns:a14="http://schemas.microsoft.com/office/drawing/2010/main" val="0"/>
+              </a:ext>
+            </a:extLst>
+          </a:blip>
+          <a:stretch>
+            <a:fillRect/>
+          </a:stretch>
+        </p:blipFill>
+        <p:spPr>
+          <a:xfrm>
+            <a:off x="2421082" y="1551350"/>
+            <a:ext cx="7349836" cy="4899888"/>
+          </a:xfrm>
+        </p:spPr>
+      </p:pic>
     </p:spTree>
     <p:extLst>
       <p:ext uri="{BB962C8B-B14F-4D97-AF65-F5344CB8AC3E}">
-        <p14:creationId xmlns:p14="http://schemas.microsoft.com/office/powerpoint/2010/main" val="204801304"/>
+        <p14:creationId xmlns:p14="http://schemas.microsoft.com/office/powerpoint/2010/main" val="2657261464"/>
       </p:ext>
     </p:extLst>
   </p:cSld>
@@ -5424,7 +5226,7 @@
           <p:cNvPr id="2" name="Title 1">
             <a:extLst>
               <a:ext uri="{FF2B5EF4-FFF2-40B4-BE49-F238E27FC236}">
-                <a16:creationId xmlns:a16="http://schemas.microsoft.com/office/drawing/2014/main" id="{DA12FCDB-5857-42AE-9A87-D9369BF4B355}"/>
+                <a16:creationId xmlns:a16="http://schemas.microsoft.com/office/drawing/2014/main" id="{9225AD55-3C25-41C9-B645-47C7016AAE09}"/>
               </a:ext>
             </a:extLst>
           </p:cNvPr>
@@ -5442,8 +5244,16 @@
           <a:p>
             <a:r>
               <a:rPr lang="en-US" dirty="0"/>
-              <a:t>Top Ten Countries</a:t>
-            </a:r>
+              <a:t>Heat Map of Countries</a:t>
+            </a:r>
+            <a:br>
+              <a:rPr lang="en-US" dirty="0"/>
+            </a:br>
+            <a:r>
+              <a:rPr lang="en-US" sz="2000" dirty="0"/>
+              <a:t>(number of objects)</a:t>
+            </a:r>
+            <a:endParaRPr lang="en-US" dirty="0"/>
           </a:p>
         </p:txBody>
       </p:sp>
@@ -5452,7 +5262,7 @@
           <p:cNvPr id="5" name="Content Placeholder 4">
             <a:extLst>
               <a:ext uri="{FF2B5EF4-FFF2-40B4-BE49-F238E27FC236}">
-                <a16:creationId xmlns:a16="http://schemas.microsoft.com/office/drawing/2014/main" id="{CD6233E9-0183-4C41-BA57-9EEE83FB8954}"/>
+                <a16:creationId xmlns:a16="http://schemas.microsoft.com/office/drawing/2014/main" id="{7ED40A56-187F-4F99-B572-53D08DE35B57}"/>
               </a:ext>
             </a:extLst>
           </p:cNvPr>
@@ -5477,15 +5287,15 @@
         </p:blipFill>
         <p:spPr>
           <a:xfrm>
-            <a:off x="2192482" y="1398950"/>
-            <a:ext cx="7807036" cy="5204688"/>
+            <a:off x="80089" y="1647507"/>
+            <a:ext cx="12031822" cy="4707574"/>
           </a:xfrm>
         </p:spPr>
       </p:pic>
     </p:spTree>
     <p:extLst>
       <p:ext uri="{BB962C8B-B14F-4D97-AF65-F5344CB8AC3E}">
-        <p14:creationId xmlns:p14="http://schemas.microsoft.com/office/powerpoint/2010/main" val="2032696390"/>
+        <p14:creationId xmlns:p14="http://schemas.microsoft.com/office/powerpoint/2010/main" val="1303035349"/>
       </p:ext>
     </p:extLst>
   </p:cSld>
@@ -5525,7 +5335,7 @@
           <p:cNvPr id="2" name="Title 1">
             <a:extLst>
               <a:ext uri="{FF2B5EF4-FFF2-40B4-BE49-F238E27FC236}">
-                <a16:creationId xmlns:a16="http://schemas.microsoft.com/office/drawing/2014/main" id="{555D1F26-F171-4F89-9348-D8380221C40B}"/>
+                <a16:creationId xmlns:a16="http://schemas.microsoft.com/office/drawing/2014/main" id="{DA12FCDB-5857-42AE-9A87-D9369BF4B355}"/>
               </a:ext>
             </a:extLst>
           </p:cNvPr>
@@ -5538,24 +5348,22 @@
         </p:nvSpPr>
         <p:spPr/>
         <p:txBody>
-          <a:bodyPr>
-            <a:normAutofit/>
-          </a:bodyPr>
-          <a:lstStyle/>
-          <a:p>
-            <a:r>
-              <a:rPr lang="en-US" sz="3600" dirty="0"/>
-              <a:t>Select Countries: Vanuatu Breakdown by Object Type</a:t>
+          <a:bodyPr/>
+          <a:lstStyle/>
+          <a:p>
+            <a:r>
+              <a:rPr lang="en-US" dirty="0"/>
+              <a:t>Top Ten Countries</a:t>
             </a:r>
           </a:p>
         </p:txBody>
       </p:sp>
       <p:pic>
         <p:nvPicPr>
-          <p:cNvPr id="7" name="Content Placeholder 6">
-            <a:extLst>
-              <a:ext uri="{FF2B5EF4-FFF2-40B4-BE49-F238E27FC236}">
-                <a16:creationId xmlns:a16="http://schemas.microsoft.com/office/drawing/2014/main" id="{404C958D-46E2-4E55-95BD-3554D96E5E9B}"/>
+          <p:cNvPr id="5" name="Content Placeholder 4">
+            <a:extLst>
+              <a:ext uri="{FF2B5EF4-FFF2-40B4-BE49-F238E27FC236}">
+                <a16:creationId xmlns:a16="http://schemas.microsoft.com/office/drawing/2014/main" id="{CD6233E9-0183-4C41-BA57-9EEE83FB8954}"/>
               </a:ext>
             </a:extLst>
           </p:cNvPr>
@@ -5574,20 +5382,21 @@
               </a:ext>
             </a:extLst>
           </a:blip>
-          <a:srcRect/>
-          <a:stretch/>
+          <a:stretch>
+            <a:fillRect/>
+          </a:stretch>
         </p:blipFill>
         <p:spPr>
           <a:xfrm>
-            <a:off x="2545773" y="1243664"/>
-            <a:ext cx="6061360" cy="6061360"/>
+            <a:off x="2192482" y="1398950"/>
+            <a:ext cx="7807036" cy="5204688"/>
           </a:xfrm>
         </p:spPr>
       </p:pic>
     </p:spTree>
     <p:extLst>
       <p:ext uri="{BB962C8B-B14F-4D97-AF65-F5344CB8AC3E}">
-        <p14:creationId xmlns:p14="http://schemas.microsoft.com/office/powerpoint/2010/main" val="2015169826"/>
+        <p14:creationId xmlns:p14="http://schemas.microsoft.com/office/powerpoint/2010/main" val="2032696390"/>
       </p:ext>
     </p:extLst>
   </p:cSld>
@@ -5646,8 +5455,8 @@
           <a:lstStyle/>
           <a:p>
             <a:r>
-              <a:rPr lang="en-US" sz="4000" dirty="0"/>
-              <a:t>Select Countries: Japan Breakdown by Object Type</a:t>
+              <a:rPr lang="en-US" sz="3600" dirty="0"/>
+              <a:t>Select Countries: Vanuatu Breakdown by Object Type</a:t>
             </a:r>
           </a:p>
         </p:txBody>
@@ -5676,21 +5485,20 @@
               </a:ext>
             </a:extLst>
           </a:blip>
-          <a:stretch>
-            <a:fillRect/>
-          </a:stretch>
+          <a:srcRect/>
+          <a:stretch/>
         </p:blipFill>
         <p:spPr>
           <a:xfrm>
-            <a:off x="2358736" y="1684222"/>
-            <a:ext cx="6435436" cy="5173778"/>
+            <a:off x="2899064" y="1316186"/>
+            <a:ext cx="5292432" cy="5292432"/>
           </a:xfrm>
         </p:spPr>
       </p:pic>
     </p:spTree>
     <p:extLst>
       <p:ext uri="{BB962C8B-B14F-4D97-AF65-F5344CB8AC3E}">
-        <p14:creationId xmlns:p14="http://schemas.microsoft.com/office/powerpoint/2010/main" val="3165494617"/>
+        <p14:creationId xmlns:p14="http://schemas.microsoft.com/office/powerpoint/2010/main" val="2015169826"/>
       </p:ext>
     </p:extLst>
   </p:cSld>

</xml_diff>

<commit_message>
Slight change to presentation.
</commit_message>
<xml_diff>
--- a/The Metropolitan Museum of Art.pptx
+++ b/The Metropolitan Museum of Art.pptx
@@ -5531,14 +5531,13 @@
               </a:ext>
             </a:extLst>
           </a:blip>
-          <a:stretch>
-            <a:fillRect/>
-          </a:stretch>
+          <a:srcRect/>
+          <a:stretch/>
         </p:blipFill>
         <p:spPr>
           <a:xfrm>
             <a:off x="608350" y="1599783"/>
-            <a:ext cx="10975300" cy="3658433"/>
+            <a:ext cx="10975299" cy="3658433"/>
           </a:xfrm>
           <a:prstGeom prst="rect">
             <a:avLst/>

</xml_diff>

<commit_message>
Added date to presentation.
</commit_message>
<xml_diff>
--- a/The Metropolitan Museum of Art.pptx
+++ b/The Metropolitan Museum of Art.pptx
@@ -3449,8 +3449,16 @@
           </a:xfrm>
         </p:spPr>
         <p:txBody>
-          <a:bodyPr/>
-          <a:lstStyle/>
+          <a:bodyPr>
+            <a:normAutofit fontScale="85000" lnSpcReduction="20000"/>
+          </a:bodyPr>
+          <a:lstStyle/>
+          <a:p>
+            <a:r>
+              <a:rPr lang="en-US"/>
+              <a:t>February 6, 2021</a:t>
+            </a:r>
+          </a:p>
           <a:p>
             <a:r>
               <a:rPr lang="en-US" dirty="0"/>

</xml_diff>